<commit_message>
Minor fixes for 2022
</commit_message>
<xml_diff>
--- a/Doc/day2_MONAILabel.pptx
+++ b/Doc/day2_MONAILabel.pptx
@@ -3671,8 +3671,8 @@
         </p:nvSpPr>
         <p:spPr>
           <a:xfrm>
-            <a:off x="266700" y="849868"/>
-            <a:ext cx="8610600" cy="3992563"/>
+            <a:off x="609600" y="960437"/>
+            <a:ext cx="7924800" cy="3992563"/>
           </a:xfrm>
           <a:prstGeom prst="rect">
             <a:avLst/>
@@ -3837,7 +3837,7 @@
               <a:buNone/>
             </a:pPr>
             <a:r>
-              <a:rPr kumimoji="0" lang="en-US" altLang="en-US" sz="1600" b="0" i="0" u="none" strike="noStrike" cap="none" normalizeH="0" baseline="0" dirty="0">
+              <a:rPr kumimoji="0" lang="en-US" altLang="en-US" sz="1200" b="0" i="0" u="none" strike="noStrike" cap="none" normalizeH="0" baseline="0" dirty="0">
                 <a:ln>
                   <a:noFill/>
                 </a:ln>
@@ -3850,7 +3850,7 @@
               <a:t>pip install </a:t>
             </a:r>
             <a:r>
-              <a:rPr kumimoji="0" lang="en-US" altLang="en-US" sz="1600" b="0" i="0" u="none" strike="noStrike" cap="none" normalizeH="0" baseline="0" dirty="0" err="1">
+              <a:rPr kumimoji="0" lang="en-US" altLang="en-US" sz="1200" b="0" i="0" u="none" strike="noStrike" cap="none" normalizeH="0" baseline="0" dirty="0" err="1">
                 <a:ln>
                   <a:noFill/>
                 </a:ln>
@@ -3863,7 +3863,7 @@
               <a:t>monailabel</a:t>
             </a:r>
             <a:r>
-              <a:rPr kumimoji="0" lang="en-US" altLang="en-US" sz="800" b="0" i="0" u="none" strike="noStrike" cap="none" normalizeH="0" baseline="0" dirty="0">
+              <a:rPr kumimoji="0" lang="en-US" altLang="en-US" sz="1200" b="0" i="0" u="none" strike="noStrike" cap="none" normalizeH="0" baseline="0" dirty="0">
                 <a:ln>
                   <a:noFill/>
                 </a:ln>
@@ -3875,7 +3875,163 @@
               </a:rPr>
               <a:t> </a:t>
             </a:r>
-            <a:endParaRPr kumimoji="0" lang="en-US" altLang="en-US" sz="4000" b="0" i="0" u="none" strike="noStrike" cap="none" normalizeH="0" baseline="0" dirty="0">
+          </a:p>
+          <a:p>
+            <a:pPr marL="0" indent="0" algn="l">
+              <a:buNone/>
+            </a:pPr>
+            <a:r>
+              <a:rPr lang="en-US" sz="1200" dirty="0" err="1">
+                <a:solidFill>
+                  <a:srgbClr val="24292F"/>
+                </a:solidFill>
+                <a:latin typeface="Consolas" panose="020B0609020204030204" pitchFamily="49" charset="0"/>
+              </a:rPr>
+              <a:t>monailabel</a:t>
+            </a:r>
+            <a:r>
+              <a:rPr lang="en-US" sz="1200" dirty="0">
+                <a:solidFill>
+                  <a:srgbClr val="24292F"/>
+                </a:solidFill>
+                <a:latin typeface="Consolas" panose="020B0609020204030204" pitchFamily="49" charset="0"/>
+              </a:rPr>
+              <a:t> apps --download --name radiology --output apps</a:t>
+            </a:r>
+          </a:p>
+          <a:p>
+            <a:pPr marL="0" indent="0" algn="l">
+              <a:buNone/>
+            </a:pPr>
+            <a:r>
+              <a:rPr lang="en-US" sz="1200" dirty="0" err="1">
+                <a:solidFill>
+                  <a:srgbClr val="24292F"/>
+                </a:solidFill>
+                <a:latin typeface="Consolas" panose="020B0609020204030204" pitchFamily="49" charset="0"/>
+              </a:rPr>
+              <a:t>monailabel</a:t>
+            </a:r>
+            <a:r>
+              <a:rPr lang="en-US" sz="1200" dirty="0">
+                <a:solidFill>
+                  <a:srgbClr val="24292F"/>
+                </a:solidFill>
+                <a:latin typeface="Consolas" panose="020B0609020204030204" pitchFamily="49" charset="0"/>
+              </a:rPr>
+              <a:t> datasets --download --name Task09_Spleen --output datasets</a:t>
+            </a:r>
+          </a:p>
+          <a:p>
+            <a:pPr marL="0" indent="0">
+              <a:buNone/>
+            </a:pPr>
+            <a:r>
+              <a:rPr kumimoji="0" lang="en-US" altLang="en-US" sz="1200" b="0" i="0" u="none" strike="noStrike" cap="none" normalizeH="0" baseline="0" dirty="0" err="1">
+                <a:ln>
+                  <a:noFill/>
+                </a:ln>
+                <a:solidFill>
+                  <a:srgbClr val="000000"/>
+                </a:solidFill>
+                <a:effectLst/>
+                <a:latin typeface="Arial Unicode MS"/>
+                <a:ea typeface="Calibri" panose="020F0502020204030204" pitchFamily="34" charset="0"/>
+                <a:cs typeface="Courier New" panose="02070309020205020404" pitchFamily="49" charset="0"/>
+              </a:rPr>
+              <a:t>monailabel</a:t>
+            </a:r>
+            <a:r>
+              <a:rPr kumimoji="0" lang="en-US" altLang="en-US" sz="1200" b="0" i="0" u="none" strike="noStrike" cap="none" normalizeH="0" baseline="0" dirty="0">
+                <a:ln>
+                  <a:noFill/>
+                </a:ln>
+                <a:solidFill>
+                  <a:srgbClr val="000000"/>
+                </a:solidFill>
+                <a:effectLst/>
+                <a:latin typeface="Arial Unicode MS"/>
+                <a:ea typeface="Calibri" panose="020F0502020204030204" pitchFamily="34" charset="0"/>
+                <a:cs typeface="Courier New" panose="02070309020205020404" pitchFamily="49" charset="0"/>
+              </a:rPr>
+              <a:t> </a:t>
+            </a:r>
+            <a:r>
+              <a:rPr kumimoji="0" lang="en-US" altLang="en-US" sz="1200" b="0" i="0" u="none" strike="noStrike" cap="none" normalizeH="0" baseline="0" dirty="0" err="1">
+                <a:ln>
+                  <a:noFill/>
+                </a:ln>
+                <a:solidFill>
+                  <a:srgbClr val="000000"/>
+                </a:solidFill>
+                <a:effectLst/>
+                <a:latin typeface="Arial Unicode MS"/>
+                <a:ea typeface="Calibri" panose="020F0502020204030204" pitchFamily="34" charset="0"/>
+                <a:cs typeface="Courier New" panose="02070309020205020404" pitchFamily="49" charset="0"/>
+              </a:rPr>
+              <a:t>start_server</a:t>
+            </a:r>
+            <a:r>
+              <a:rPr kumimoji="0" lang="en-US" altLang="en-US" sz="1200" b="0" i="0" u="none" strike="noStrike" cap="none" normalizeH="0" baseline="0" dirty="0">
+                <a:ln>
+                  <a:noFill/>
+                </a:ln>
+                <a:solidFill>
+                  <a:srgbClr val="000000"/>
+                </a:solidFill>
+                <a:effectLst/>
+                <a:latin typeface="Arial Unicode MS"/>
+                <a:ea typeface="Calibri" panose="020F0502020204030204" pitchFamily="34" charset="0"/>
+                <a:cs typeface="Courier New" panose="02070309020205020404" pitchFamily="49" charset="0"/>
+              </a:rPr>
+              <a:t> --app apps/radiology --studies datasets/Task09_Spleen/</a:t>
+            </a:r>
+            <a:r>
+              <a:rPr kumimoji="0" lang="en-US" altLang="en-US" sz="1200" b="0" i="0" u="none" strike="noStrike" cap="none" normalizeH="0" baseline="0" dirty="0" err="1">
+                <a:ln>
+                  <a:noFill/>
+                </a:ln>
+                <a:solidFill>
+                  <a:srgbClr val="000000"/>
+                </a:solidFill>
+                <a:effectLst/>
+                <a:latin typeface="Arial Unicode MS"/>
+                <a:ea typeface="Calibri" panose="020F0502020204030204" pitchFamily="34" charset="0"/>
+                <a:cs typeface="Courier New" panose="02070309020205020404" pitchFamily="49" charset="0"/>
+              </a:rPr>
+              <a:t>imagesTr</a:t>
+            </a:r>
+            <a:r>
+              <a:rPr kumimoji="0" lang="en-US" altLang="en-US" sz="1200" b="0" i="0" u="none" strike="noStrike" cap="none" normalizeH="0" baseline="0" dirty="0">
+                <a:ln>
+                  <a:noFill/>
+                </a:ln>
+                <a:solidFill>
+                  <a:srgbClr val="000000"/>
+                </a:solidFill>
+                <a:effectLst/>
+                <a:latin typeface="Arial Unicode MS"/>
+                <a:ea typeface="Calibri" panose="020F0502020204030204" pitchFamily="34" charset="0"/>
+                <a:cs typeface="Courier New" panose="02070309020205020404" pitchFamily="49" charset="0"/>
+              </a:rPr>
+              <a:t> --conf models </a:t>
+            </a:r>
+            <a:r>
+              <a:rPr kumimoji="0" lang="en-US" altLang="en-US" sz="1200" b="0" i="0" u="none" strike="noStrike" cap="none" normalizeH="0" baseline="0" dirty="0" err="1">
+                <a:ln>
+                  <a:noFill/>
+                </a:ln>
+                <a:solidFill>
+                  <a:srgbClr val="000000"/>
+                </a:solidFill>
+                <a:effectLst/>
+                <a:latin typeface="Arial Unicode MS"/>
+                <a:ea typeface="Calibri" panose="020F0502020204030204" pitchFamily="34" charset="0"/>
+                <a:cs typeface="Courier New" panose="02070309020205020404" pitchFamily="49" charset="0"/>
+              </a:rPr>
+              <a:t>deepedit</a:t>
+            </a:r>
+            <a:endParaRPr kumimoji="0" lang="en-US" altLang="en-US" sz="1200" b="0" i="0" u="none" strike="noStrike" cap="none" normalizeH="0" baseline="0" dirty="0">
               <a:ln>
                 <a:noFill/>
               </a:ln>
@@ -3883,75 +4039,7 @@
                 <a:schemeClr val="tx1"/>
               </a:solidFill>
               <a:effectLst/>
-              <a:latin typeface="Consolas" panose="020B0609020204030204" pitchFamily="49" charset="0"/>
-            </a:endParaRPr>
-          </a:p>
-          <a:p>
-            <a:pPr marL="0" indent="0" algn="l">
-              <a:buNone/>
-            </a:pPr>
-            <a:r>
-              <a:rPr lang="en-US" sz="1600" dirty="0" err="1">
-                <a:solidFill>
-                  <a:srgbClr val="24292F"/>
-                </a:solidFill>
-                <a:latin typeface="Consolas" panose="020B0609020204030204" pitchFamily="49" charset="0"/>
-              </a:rPr>
-              <a:t>monailabel</a:t>
-            </a:r>
-            <a:r>
-              <a:rPr lang="en-US" sz="1600" dirty="0">
-                <a:solidFill>
-                  <a:srgbClr val="24292F"/>
-                </a:solidFill>
-                <a:latin typeface="Consolas" panose="020B0609020204030204" pitchFamily="49" charset="0"/>
-              </a:rPr>
-              <a:t> apps --download --name radiology --output apps</a:t>
-            </a:r>
-          </a:p>
-          <a:p>
-            <a:pPr marL="0" indent="0" algn="l">
-              <a:buNone/>
-            </a:pPr>
-            <a:r>
-              <a:rPr lang="en-US" sz="1600" dirty="0" err="1">
-                <a:solidFill>
-                  <a:srgbClr val="24292F"/>
-                </a:solidFill>
-                <a:latin typeface="Consolas" panose="020B0609020204030204" pitchFamily="49" charset="0"/>
-              </a:rPr>
-              <a:t>monailabel</a:t>
-            </a:r>
-            <a:r>
-              <a:rPr lang="en-US" sz="1600" dirty="0">
-                <a:solidFill>
-                  <a:srgbClr val="24292F"/>
-                </a:solidFill>
-                <a:latin typeface="Consolas" panose="020B0609020204030204" pitchFamily="49" charset="0"/>
-              </a:rPr>
-              <a:t> datasets --download --name Task09_Spleen --output datasets</a:t>
-            </a:r>
-          </a:p>
-          <a:p>
-            <a:pPr marL="0" indent="0" algn="l">
-              <a:buNone/>
-            </a:pPr>
-            <a:endParaRPr lang="en-US" sz="1600" dirty="0">
-              <a:solidFill>
-                <a:srgbClr val="24292F"/>
-              </a:solidFill>
-              <a:latin typeface="-apple-system"/>
-            </a:endParaRPr>
-          </a:p>
-          <a:p>
-            <a:pPr marL="0" indent="0" algn="l">
-              <a:buNone/>
-            </a:pPr>
-            <a:endParaRPr lang="en-US" sz="1600" dirty="0">
-              <a:solidFill>
-                <a:srgbClr val="24292F"/>
-              </a:solidFill>
-              <a:latin typeface="-apple-system"/>
+              <a:latin typeface="Arial" panose="020B0604020202020204" pitchFamily="34" charset="0"/>
             </a:endParaRPr>
           </a:p>
         </p:txBody>
@@ -3970,7 +4058,7 @@
         </p:nvSpPr>
         <p:spPr>
           <a:xfrm>
-            <a:off x="309454" y="5638800"/>
+            <a:off x="309454" y="5879068"/>
             <a:ext cx="8458198" cy="369332"/>
           </a:xfrm>
           <a:prstGeom prst="rect">
@@ -3996,138 +4084,6 @@
               <a:t>http://perklabseg.asuscomm.com:8000</a:t>
             </a:r>
             <a:endParaRPr lang="en-CA" b="1" dirty="0"/>
-          </a:p>
-        </p:txBody>
-      </p:sp>
-      <p:sp>
-        <p:nvSpPr>
-          <p:cNvPr id="7" name="Rectangle 3">
-            <a:extLst>
-              <a:ext uri="{FF2B5EF4-FFF2-40B4-BE49-F238E27FC236}">
-                <a16:creationId xmlns:a16="http://schemas.microsoft.com/office/drawing/2014/main" id="{9CAF393E-4D5B-3AD2-D92F-6A2767B9D2F5}"/>
-              </a:ext>
-            </a:extLst>
-          </p:cNvPr>
-          <p:cNvSpPr>
-            <a:spLocks noChangeArrowheads="1"/>
-          </p:cNvSpPr>
-          <p:nvPr/>
-        </p:nvSpPr>
-        <p:spPr bwMode="auto">
-          <a:xfrm>
-            <a:off x="0" y="0"/>
-            <a:ext cx="9144000" cy="457200"/>
-          </a:xfrm>
-          <a:prstGeom prst="rect">
-            <a:avLst/>
-          </a:prstGeom>
-          <a:noFill/>
-          <a:ln>
-            <a:noFill/>
-          </a:ln>
-          <a:effectLst/>
-          <a:extLst>
-            <a:ext uri="{909E8E84-426E-40DD-AFC4-6F175D3DCCD1}">
-              <a14:hiddenFill xmlns:a14="http://schemas.microsoft.com/office/drawing/2010/main">
-                <a:solidFill>
-                  <a:schemeClr val="accent1"/>
-                </a:solidFill>
-              </a14:hiddenFill>
-            </a:ext>
-            <a:ext uri="{91240B29-F687-4F45-9708-019B960494DF}">
-              <a14:hiddenLine xmlns:a14="http://schemas.microsoft.com/office/drawing/2010/main" w="9525">
-                <a:solidFill>
-                  <a:schemeClr val="tx1"/>
-                </a:solidFill>
-                <a:miter lim="800000"/>
-                <a:headEnd/>
-                <a:tailEnd/>
-              </a14:hiddenLine>
-            </a:ext>
-            <a:ext uri="{AF507438-7753-43E0-B8FC-AC1667EBCBE1}">
-              <a14:hiddenEffects xmlns:a14="http://schemas.microsoft.com/office/drawing/2010/main">
-                <a:effectLst>
-                  <a:outerShdw dist="35921" dir="2700000" algn="ctr" rotWithShape="0">
-                    <a:schemeClr val="bg2"/>
-                  </a:outerShdw>
-                </a:effectLst>
-              </a14:hiddenEffects>
-            </a:ext>
-          </a:extLst>
-        </p:spPr>
-        <p:txBody>
-          <a:bodyPr vert="horz" wrap="none" lIns="91440" tIns="0" rIns="91440" bIns="0" numCol="1" anchor="ctr" anchorCtr="0" compatLnSpc="1">
-            <a:prstTxWarp prst="textNoShape">
-              <a:avLst/>
-            </a:prstTxWarp>
-            <a:spAutoFit/>
-          </a:bodyPr>
-          <a:lstStyle/>
-          <a:p>
-            <a:pPr marL="0" marR="0" lvl="0" indent="0" algn="l" defTabSz="914400" rtl="0" eaLnBrk="0" fontAlgn="base" latinLnBrk="0" hangingPunct="0">
-              <a:lnSpc>
-                <a:spcPct val="100000"/>
-              </a:lnSpc>
-              <a:spcBef>
-                <a:spcPct val="0"/>
-              </a:spcBef>
-              <a:spcAft>
-                <a:spcPct val="0"/>
-              </a:spcAft>
-              <a:buClrTx/>
-              <a:buSzTx/>
-              <a:buFontTx/>
-              <a:buNone/>
-              <a:tabLst/>
-            </a:pPr>
-            <a:r>
-              <a:rPr kumimoji="0" lang="en-US" altLang="en-US" sz="900" b="0" i="0" u="none" strike="noStrike" cap="none" normalizeH="0" baseline="0" dirty="0">
-                <a:ln>
-                  <a:noFill/>
-                </a:ln>
-                <a:solidFill>
-                  <a:srgbClr val="24292F"/>
-                </a:solidFill>
-                <a:effectLst/>
-                <a:latin typeface="ui-monospace"/>
-              </a:rPr>
-              <a:t>pip install </a:t>
-            </a:r>
-            <a:r>
-              <a:rPr kumimoji="0" lang="en-US" altLang="en-US" sz="900" b="0" i="0" u="none" strike="noStrike" cap="none" normalizeH="0" baseline="0" dirty="0" err="1">
-                <a:ln>
-                  <a:noFill/>
-                </a:ln>
-                <a:solidFill>
-                  <a:srgbClr val="24292F"/>
-                </a:solidFill>
-                <a:effectLst/>
-                <a:latin typeface="ui-monospace"/>
-              </a:rPr>
-              <a:t>monailabel</a:t>
-            </a:r>
-            <a:r>
-              <a:rPr kumimoji="0" lang="en-US" altLang="en-US" sz="500" b="0" i="0" u="none" strike="noStrike" cap="none" normalizeH="0" baseline="0" dirty="0">
-                <a:ln>
-                  <a:noFill/>
-                </a:ln>
-                <a:solidFill>
-                  <a:schemeClr val="tx1"/>
-                </a:solidFill>
-                <a:effectLst/>
-              </a:rPr>
-              <a:t> </a:t>
-            </a:r>
-            <a:endParaRPr kumimoji="0" lang="en-US" altLang="en-US" sz="1800" b="0" i="0" u="none" strike="noStrike" cap="none" normalizeH="0" baseline="0" dirty="0">
-              <a:ln>
-                <a:noFill/>
-              </a:ln>
-              <a:solidFill>
-                <a:schemeClr val="tx1"/>
-              </a:solidFill>
-              <a:effectLst/>
-              <a:latin typeface="Arial" panose="020B0604020202020204" pitchFamily="34" charset="0"/>
-            </a:endParaRPr>
           </a:p>
         </p:txBody>
       </p:sp>
@@ -4153,7 +4109,7 @@
         </p:blipFill>
         <p:spPr>
           <a:xfrm>
-            <a:off x="1524000" y="1828800"/>
+            <a:off x="1524000" y="2069068"/>
             <a:ext cx="5829300" cy="3731165"/>
           </a:xfrm>
           <a:prstGeom prst="rect">

</xml_diff>